<commit_message>
Updated slides and created data sets
</commit_message>
<xml_diff>
--- a/slides/day 1/D1C1_LR_NNs.pptx
+++ b/slides/day 1/D1C1_LR_NNs.pptx
@@ -3519,7 +3519,7 @@
           <a:p>
             <a:fld id="{FF5685EE-3D40-0A4E-BB88-46887330FC0A}" type="datetimeFigureOut">
               <a:rPr lang="en-US" smtClean="0"/>
-              <a:t>9/29/25</a:t>
+              <a:t>9/30/25</a:t>
             </a:fld>
             <a:endParaRPr lang="en-US"/>
           </a:p>
@@ -4064,7 +4064,7 @@
             <a:fld id="{16F2FB5F-D553-C945-B874-A642CC0C851F}" type="datetime3">
               <a:rPr lang="en-IE" smtClean="0"/>
               <a:pPr/>
-              <a:t>29 September 2025</a:t>
+              <a:t>30 September 2025</a:t>
             </a:fld>
             <a:endParaRPr lang="en-US" dirty="0"/>
           </a:p>
@@ -5381,7 +5381,7 @@
           <a:p>
             <a:fld id="{D724839B-90DF-FA46-9D52-D10060A86ADB}" type="datetime3">
               <a:rPr lang="en-IE" smtClean="0"/>
-              <a:t>29 September 2025</a:t>
+              <a:t>30 September 2025</a:t>
             </a:fld>
             <a:endParaRPr lang="en-US"/>
           </a:p>
@@ -5670,7 +5670,7 @@
           <a:p>
             <a:fld id="{D3F12174-D4B7-E74D-A582-5C71C550CABE}" type="datetime3">
               <a:rPr lang="en-IE" smtClean="0"/>
-              <a:t>29 September 2025</a:t>
+              <a:t>30 September 2025</a:t>
             </a:fld>
             <a:endParaRPr lang="en-US"/>
           </a:p>
@@ -5966,7 +5966,7 @@
             <a:fld id="{16F2FB5F-D553-C945-B874-A642CC0C851F}" type="datetime3">
               <a:rPr lang="en-IE" smtClean="0"/>
               <a:pPr/>
-              <a:t>29 September 2025</a:t>
+              <a:t>30 September 2025</a:t>
             </a:fld>
             <a:endParaRPr lang="en-US" dirty="0"/>
           </a:p>
@@ -6178,7 +6178,7 @@
             <a:fld id="{16F2FB5F-D553-C945-B874-A642CC0C851F}" type="datetime3">
               <a:rPr lang="en-IE" smtClean="0"/>
               <a:pPr/>
-              <a:t>29 September 2025</a:t>
+              <a:t>30 September 2025</a:t>
             </a:fld>
             <a:endParaRPr lang="en-US" dirty="0"/>
           </a:p>
@@ -6575,7 +6575,7 @@
           <a:p>
             <a:fld id="{07196900-CA2A-2D43-9641-C5C0DD2D22D3}" type="datetime3">
               <a:rPr lang="en-IE" smtClean="0"/>
-              <a:t>29 September 2025</a:t>
+              <a:t>30 September 2025</a:t>
             </a:fld>
             <a:endParaRPr lang="en-US"/>
           </a:p>
@@ -6843,7 +6843,7 @@
           <a:p>
             <a:fld id="{8AB1A910-F8E0-D541-83F2-2CFD6E718762}" type="datetime3">
               <a:rPr lang="en-IE" smtClean="0"/>
-              <a:t>29 September 2025</a:t>
+              <a:t>30 September 2025</a:t>
             </a:fld>
             <a:endParaRPr lang="en-US"/>
           </a:p>
@@ -6985,7 +6985,7 @@
           <a:p>
             <a:fld id="{7E245B59-D3F3-5B43-BDD1-6C7B7CFD2AA6}" type="datetime3">
               <a:rPr lang="en-IE" smtClean="0"/>
-              <a:t>29 September 2025</a:t>
+              <a:t>30 September 2025</a:t>
             </a:fld>
             <a:endParaRPr lang="en-US"/>
           </a:p>
@@ -7098,7 +7098,7 @@
           <a:p>
             <a:fld id="{AD77DDCF-3644-8C44-AE36-2C59F897E125}" type="datetime3">
               <a:rPr lang="en-IE" smtClean="0"/>
-              <a:t>29 September 2025</a:t>
+              <a:t>30 September 2025</a:t>
             </a:fld>
             <a:endParaRPr lang="en-US"/>
           </a:p>
@@ -8169,7 +8169,7 @@
           <a:p>
             <a:fld id="{C1B28D5F-B017-3B47-9775-DA319F6143FF}" type="datetime3">
               <a:rPr lang="en-IE" smtClean="0"/>
-              <a:t>29 September 2025</a:t>
+              <a:t>30 September 2025</a:t>
             </a:fld>
             <a:endParaRPr lang="en-US" dirty="0"/>
           </a:p>
@@ -9240,8 +9240,8 @@
           </a:p>
         </p:txBody>
       </p:sp>
-      <mc:AlternateContent xmlns:mc="http://schemas.openxmlformats.org/markup-compatibility/2006" xmlns:a14="http://schemas.microsoft.com/office/drawing/2010/main">
-        <mc:Choice Requires="a14">
+      <mc:AlternateContent xmlns:mc="http://schemas.openxmlformats.org/markup-compatibility/2006">
+        <mc:Choice xmlns:a14="http://schemas.microsoft.com/office/drawing/2010/main" Requires="a14">
           <p:sp>
             <p:nvSpPr>
               <p:cNvPr id="3" name="Content Placeholder 2">
@@ -9332,7 +9332,7 @@
                         <a:rPr lang="en-IE" b="0" i="1" smtClean="0">
                           <a:latin typeface="Cambria Math" panose="02040503050406030204" pitchFamily="18" charset="0"/>
                         </a:rPr>
-                        <m:t>𝑒</m:t>
+                        <m:t>𝑟</m:t>
                       </m:r>
                     </m:oMath>
                   </m:oMathPara>
@@ -9409,16 +9409,16 @@
                 <a14:m>
                   <m:oMath xmlns:m="http://schemas.openxmlformats.org/officeDocument/2006/math">
                     <m:r>
-                      <a:rPr lang="en-US" i="1" dirty="0" smtClean="0">
+                      <a:rPr lang="en-IE" b="0" i="1" dirty="0" smtClean="0">
                         <a:latin typeface="Cambria Math" panose="02040503050406030204" pitchFamily="18" charset="0"/>
                       </a:rPr>
-                      <m:t>𝑒</m:t>
+                      <m:t>𝑟</m:t>
                     </m:r>
                   </m:oMath>
                 </a14:m>
                 <a:r>
                   <a:rPr lang="en-US" dirty="0"/>
-                  <a:t> is an error (or residual) leftover term</a:t>
+                  <a:t> is a residual (or error) leftover term</a:t>
                 </a:r>
               </a:p>
               <a:p>
@@ -9488,10 +9488,10 @@
                           </m:sSupPr>
                           <m:e>
                             <m:r>
-                              <a:rPr lang="en-US" i="1" dirty="0">
+                              <a:rPr lang="en-IE" b="0" i="1" dirty="0" smtClean="0">
                                 <a:latin typeface="Cambria Math" panose="02040503050406030204" pitchFamily="18" charset="0"/>
                               </a:rPr>
-                              <m:t>𝑒</m:t>
+                              <m:t>𝑟</m:t>
                             </m:r>
                           </m:e>
                           <m:sup>
@@ -9540,7 +9540,7 @@
                         <m:sSup>
                           <m:sSupPr>
                             <m:ctrlPr>
-                              <a:rPr lang="en-US" i="1" dirty="0">
+                              <a:rPr lang="en-US" i="1" dirty="0" smtClean="0">
                                 <a:solidFill>
                                   <a:srgbClr val="009749"/>
                                 </a:solidFill>
@@ -9550,13 +9550,13 @@
                           </m:sSupPr>
                           <m:e>
                             <m:r>
-                              <a:rPr lang="en-US" i="1" dirty="0">
+                              <a:rPr lang="en-IE" b="0" i="1" dirty="0" smtClean="0">
                                 <a:solidFill>
                                   <a:srgbClr val="009749"/>
                                 </a:solidFill>
                                 <a:latin typeface="Cambria Math" panose="02040503050406030204" pitchFamily="18" charset="0"/>
                               </a:rPr>
-                              <m:t>𝑒</m:t>
+                              <m:t>𝑟</m:t>
                             </m:r>
                           </m:e>
                           <m:sup>
@@ -9587,7 +9587,7 @@
             </p:txBody>
           </p:sp>
         </mc:Choice>
-        <mc:Fallback xmlns="">
+        <mc:Fallback>
           <p:sp>
             <p:nvSpPr>
               <p:cNvPr id="3" name="Content Placeholder 2">
@@ -12125,7 +12125,12 @@
             <p:ph idx="1"/>
           </p:nvPr>
         </p:nvSpPr>
-        <p:spPr/>
+        <p:spPr>
+          <a:xfrm>
+            <a:off x="838199" y="1825625"/>
+            <a:ext cx="8605603" cy="4149290"/>
+          </a:xfrm>
+        </p:spPr>
         <p:txBody>
           <a:bodyPr>
             <a:normAutofit/>
@@ -12134,7 +12139,7 @@
           <a:p>
             <a:r>
               <a:rPr lang="en-US" dirty="0"/>
-              <a:t>Quick round table</a:t>
+              <a:t>Quick round table (who are you and why are you here?)</a:t>
             </a:r>
           </a:p>
           <a:p>
@@ -12322,7 +12327,7 @@
         <p:spPr/>
         <p:txBody>
           <a:bodyPr>
-            <a:normAutofit fontScale="85000" lnSpcReduction="20000"/>
+            <a:normAutofit fontScale="62500" lnSpcReduction="20000"/>
           </a:bodyPr>
           <a:lstStyle/>
           <a:p>
@@ -12334,7 +12339,7 @@
                 <a:latin typeface="Courier New" panose="02070309020205020404" pitchFamily="49" charset="0"/>
                 <a:cs typeface="Courier New" panose="02070309020205020404" pitchFamily="49" charset="0"/>
               </a:rPr>
-              <a:t>Epoch 0, Loss: 8.1828, w: 0.5015, b: 0.0320</a:t>
+              <a:t>Epoch    0 | RMSE: 0.945800 | w: 0.998072 | b: 0.999874</a:t>
             </a:r>
           </a:p>
           <a:p>
@@ -12346,7 +12351,7 @@
                 <a:latin typeface="Courier New" panose="02070309020205020404" pitchFamily="49" charset="0"/>
                 <a:cs typeface="Courier New" panose="02070309020205020404" pitchFamily="49" charset="0"/>
               </a:rPr>
-              <a:t>Epoch 10, Loss: 0.7277, w: 1.0198, b: 0.0649</a:t>
+              <a:t>Epoch   12 | RMSE: 0.808423 | w: 0.981143 | b: 0.998764</a:t>
             </a:r>
           </a:p>
           <a:p>
@@ -12358,7 +12363,7 @@
                 <a:latin typeface="Courier New" panose="02070309020205020404" pitchFamily="49" charset="0"/>
                 <a:cs typeface="Courier New" panose="02070309020205020404" pitchFamily="49" charset="0"/>
               </a:rPr>
-              <a:t>Epoch 20, Loss: 0.7276, w: 1.0204, b: 0.0647</a:t>
+              <a:t>Epoch   24 | RMSE: 0.762661 | w: 0.971897 | b: 0.998145</a:t>
             </a:r>
           </a:p>
           <a:p>
@@ -12370,7 +12375,7 @@
                 <a:latin typeface="Courier New" panose="02070309020205020404" pitchFamily="49" charset="0"/>
                 <a:cs typeface="Courier New" panose="02070309020205020404" pitchFamily="49" charset="0"/>
               </a:rPr>
-              <a:t>Epoch 30, Loss: 0.7276, w: 1.0204, b: 0.0645</a:t>
+              <a:t>Epoch   36 | RMSE: 0.748466 | w: 0.966848 | b: 0.997794</a:t>
             </a:r>
           </a:p>
           <a:p>
@@ -12382,7 +12387,7 @@
                 <a:latin typeface="Courier New" panose="02070309020205020404" pitchFamily="49" charset="0"/>
                 <a:cs typeface="Courier New" panose="02070309020205020404" pitchFamily="49" charset="0"/>
               </a:rPr>
-              <a:t>Epoch 40, Loss: 0.7276, w: 1.0204, b: 0.0643</a:t>
+              <a:t>Epoch   48 | RMSE: 0.744178 | w: 0.964091 | b: 0.997589</a:t>
             </a:r>
           </a:p>
           <a:p>
@@ -12394,7 +12399,7 @@
                 <a:latin typeface="Courier New" panose="02070309020205020404" pitchFamily="49" charset="0"/>
                 <a:cs typeface="Courier New" panose="02070309020205020404" pitchFamily="49" charset="0"/>
               </a:rPr>
-              <a:t>Epoch 50, Loss: 0.7276, w: 1.0204, b: 0.0640</a:t>
+              <a:t>Epoch   60 | RMSE: 0.742894 | w: 0.962586 | b: 0.997464</a:t>
             </a:r>
           </a:p>
           <a:p>
@@ -12406,7 +12411,7 @@
                 <a:latin typeface="Courier New" panose="02070309020205020404" pitchFamily="49" charset="0"/>
                 <a:cs typeface="Courier New" panose="02070309020205020404" pitchFamily="49" charset="0"/>
               </a:rPr>
-              <a:t>Epoch 60, Loss: 0.7276, w: 1.0204, b: 0.0638</a:t>
+              <a:t>Epoch   72 | RMSE: 0.742510 | w: 0.961764 | b: 0.997383</a:t>
             </a:r>
           </a:p>
           <a:p>
@@ -12418,7 +12423,7 @@
                 <a:latin typeface="Courier New" panose="02070309020205020404" pitchFamily="49" charset="0"/>
                 <a:cs typeface="Courier New" panose="02070309020205020404" pitchFamily="49" charset="0"/>
               </a:rPr>
-              <a:t>Epoch 70, Loss: 0.7276, w: 1.0204, b: 0.0636</a:t>
+              <a:t>Epoch   84 | RMSE: 0.742395 | w: 0.961317 | b: 0.997326</a:t>
             </a:r>
           </a:p>
           <a:p>
@@ -12430,7 +12435,7 @@
                 <a:latin typeface="Courier New" panose="02070309020205020404" pitchFamily="49" charset="0"/>
                 <a:cs typeface="Courier New" panose="02070309020205020404" pitchFamily="49" charset="0"/>
               </a:rPr>
-              <a:t>Epoch 80, Loss: 0.7276, w: 1.0205, b: 0.0634</a:t>
+              <a:t>Epoch   96 | RMSE: 0.742360 | w: 0.961073 | b: 0.997282</a:t>
             </a:r>
           </a:p>
           <a:p>
@@ -12442,7 +12447,7 @@
                 <a:latin typeface="Courier New" panose="02070309020205020404" pitchFamily="49" charset="0"/>
                 <a:cs typeface="Courier New" panose="02070309020205020404" pitchFamily="49" charset="0"/>
               </a:rPr>
-              <a:t>Epoch 90, Loss: 0.7276, w: 1.0205, b: 0.0631</a:t>
+              <a:t>Epoch  108 | RMSE: 0.742350 | w: 0.960941 | b: 0.997245</a:t>
             </a:r>
           </a:p>
         </p:txBody>
@@ -13173,7 +13178,7 @@
           <a:p>
             <a:r>
               <a:rPr lang="en-US" dirty="0"/>
-              <a:t>Stochastic GD: updates using fewer samples; faster but noisy</a:t>
+              <a:t>Stochastic GD: updates using fewer (or just one) samples; faster but noisy</a:t>
             </a:r>
           </a:p>
           <a:p>
@@ -13282,7 +13287,15 @@
                 <a:ea typeface="Arial" pitchFamily="34" charset="-122"/>
                 <a:cs typeface="Arial" pitchFamily="34" charset="-120"/>
               </a:rPr>
-              <a:t>Feature Scaling &amp; Normalization</a:t>
+              <a:t>Feature Scaling &amp; </a:t>
+            </a:r>
+            <a:r>
+              <a:rPr lang="en-US" sz="4400" dirty="0" err="1">
+                <a:latin typeface="Arial" pitchFamily="34" charset="0"/>
+                <a:ea typeface="Arial" pitchFamily="34" charset="-122"/>
+                <a:cs typeface="Arial" pitchFamily="34" charset="-120"/>
+              </a:rPr>
+              <a:t>Normalisation</a:t>
             </a:r>
             <a:endParaRPr lang="en-US" dirty="0"/>
           </a:p>
@@ -13315,8 +13328,13 @@
             </a:pPr>
             <a:r>
               <a:rPr lang="en-US" sz="2800" dirty="0"/>
-              <a:t>Inputs on different scales slow down optimization</a:t>
-            </a:r>
+              <a:t>Inputs on different scales slow down </a:t>
+            </a:r>
+            <a:r>
+              <a:rPr lang="en-US" sz="2800" dirty="0" err="1"/>
+              <a:t>optimisation</a:t>
+            </a:r>
+            <a:endParaRPr lang="en-US" sz="2800" dirty="0"/>
           </a:p>
           <a:p>
             <a:pPr marL="190500" indent="-190500">
@@ -13324,8 +13342,12 @@
               <a:buChar char="•"/>
             </a:pPr>
             <a:r>
+              <a:rPr lang="en-US" sz="2800" dirty="0" err="1"/>
+              <a:t>Standardise</a:t>
+            </a:r>
+            <a:r>
               <a:rPr lang="en-US" sz="2800" dirty="0"/>
-              <a:t>Standardize by removing the mean and scaling to unit variance</a:t>
+              <a:t> by removing the mean and scaling to unit variance</a:t>
             </a:r>
           </a:p>
           <a:p>
@@ -15126,82 +15148,132 @@
         </p:nvSpPr>
         <p:spPr>
           <a:xfrm>
-            <a:off x="1137034" y="2198362"/>
-            <a:ext cx="4958966" cy="3917773"/>
+            <a:off x="738247" y="2184914"/>
+            <a:ext cx="5825897" cy="3917773"/>
           </a:xfrm>
         </p:spPr>
         <p:txBody>
           <a:bodyPr vert="horz" lIns="91440" tIns="45720" rIns="91440" bIns="45720" rtlCol="0">
-            <a:normAutofit/>
+            <a:normAutofit fontScale="92500"/>
           </a:bodyPr>
           <a:lstStyle/>
           <a:p>
-            <a:pPr marL="0"/>
-            <a:r>
-              <a:rPr lang="en-US" sz="1300"/>
+            <a:pPr marL="0" indent="0">
+              <a:buNone/>
+            </a:pPr>
+            <a:r>
+              <a:rPr lang="en-US" sz="1300" dirty="0">
+                <a:latin typeface="Courier New" panose="02070309020205020404" pitchFamily="49" charset="0"/>
+                <a:cs typeface="Courier New" panose="02070309020205020404" pitchFamily="49" charset="0"/>
+              </a:rPr>
               <a:t>Epoch 0, Loss: 0.6931, w1: 0.0013, w2: -0.0127, b: -0.0001</a:t>
             </a:r>
           </a:p>
           <a:p>
-            <a:pPr marL="0"/>
-            <a:r>
-              <a:rPr lang="en-US" sz="1300"/>
+            <a:pPr marL="0" indent="0">
+              <a:buNone/>
+            </a:pPr>
+            <a:r>
+              <a:rPr lang="en-US" sz="1300" dirty="0">
+                <a:latin typeface="Courier New" panose="02070309020205020404" pitchFamily="49" charset="0"/>
+                <a:cs typeface="Courier New" panose="02070309020205020404" pitchFamily="49" charset="0"/>
+              </a:rPr>
               <a:t>Epoch 10, Loss: 0.6091, w1: 0.0146, w2: -0.1398, b: -0.0014</a:t>
             </a:r>
           </a:p>
           <a:p>
-            <a:pPr marL="0"/>
-            <a:r>
-              <a:rPr lang="en-US" sz="1300"/>
+            <a:pPr marL="0" indent="0">
+              <a:buNone/>
+            </a:pPr>
+            <a:r>
+              <a:rPr lang="en-US" sz="1300" dirty="0">
+                <a:latin typeface="Courier New" panose="02070309020205020404" pitchFamily="49" charset="0"/>
+                <a:cs typeface="Courier New" panose="02070309020205020404" pitchFamily="49" charset="0"/>
+              </a:rPr>
               <a:t>Epoch 20, Loss: 0.5366, w1: 0.0279, w2: -0.2670, b: -0.0026</a:t>
             </a:r>
           </a:p>
           <a:p>
-            <a:pPr marL="0"/>
-            <a:r>
-              <a:rPr lang="en-US" sz="1300"/>
+            <a:pPr marL="0" indent="0">
+              <a:buNone/>
+            </a:pPr>
+            <a:r>
+              <a:rPr lang="en-US" sz="1300" dirty="0">
+                <a:latin typeface="Courier New" panose="02070309020205020404" pitchFamily="49" charset="0"/>
+                <a:cs typeface="Courier New" panose="02070309020205020404" pitchFamily="49" charset="0"/>
+              </a:rPr>
               <a:t>Epoch 30, Loss: 0.4747, w1: 0.0412, w2: -0.3941, b: -0.0038</a:t>
             </a:r>
           </a:p>
           <a:p>
-            <a:pPr marL="0"/>
-            <a:r>
-              <a:rPr lang="en-US" sz="1300"/>
+            <a:pPr marL="0" indent="0">
+              <a:buNone/>
+            </a:pPr>
+            <a:r>
+              <a:rPr lang="en-US" sz="1300" dirty="0">
+                <a:latin typeface="Courier New" panose="02070309020205020404" pitchFamily="49" charset="0"/>
+                <a:cs typeface="Courier New" panose="02070309020205020404" pitchFamily="49" charset="0"/>
+              </a:rPr>
               <a:t>Epoch 40, Loss: 0.4223, w1: 0.0545, w2: -0.5212, b: -0.0051</a:t>
             </a:r>
           </a:p>
           <a:p>
-            <a:pPr marL="0"/>
-            <a:r>
-              <a:rPr lang="en-US" sz="1300"/>
+            <a:pPr marL="0" indent="0">
+              <a:buNone/>
+            </a:pPr>
+            <a:r>
+              <a:rPr lang="en-US" sz="1300" dirty="0">
+                <a:latin typeface="Courier New" panose="02070309020205020404" pitchFamily="49" charset="0"/>
+                <a:cs typeface="Courier New" panose="02070309020205020404" pitchFamily="49" charset="0"/>
+              </a:rPr>
               <a:t>Epoch 50, Loss: 0.3782, w1: 0.0678, w2: -0.6483, b: -0.0063</a:t>
             </a:r>
           </a:p>
           <a:p>
-            <a:pPr marL="0"/>
-            <a:r>
-              <a:rPr lang="en-US" sz="1300"/>
+            <a:pPr marL="0" indent="0">
+              <a:buNone/>
+            </a:pPr>
+            <a:r>
+              <a:rPr lang="en-US" sz="1300" dirty="0">
+                <a:latin typeface="Courier New" panose="02070309020205020404" pitchFamily="49" charset="0"/>
+                <a:cs typeface="Courier New" panose="02070309020205020404" pitchFamily="49" charset="0"/>
+              </a:rPr>
               <a:t>Epoch 60, Loss: 0.3409, w1: 0.0810, w2: -0.7755, b: -0.0075</a:t>
             </a:r>
           </a:p>
           <a:p>
-            <a:pPr marL="0"/>
-            <a:r>
-              <a:rPr lang="en-US" sz="1300"/>
+            <a:pPr marL="0" indent="0">
+              <a:buNone/>
+            </a:pPr>
+            <a:r>
+              <a:rPr lang="en-US" sz="1300" dirty="0">
+                <a:latin typeface="Courier New" panose="02070309020205020404" pitchFamily="49" charset="0"/>
+                <a:cs typeface="Courier New" panose="02070309020205020404" pitchFamily="49" charset="0"/>
+              </a:rPr>
               <a:t>Epoch 70, Loss: 0.3094, w1: 0.0943, w2: -0.9026, b: -0.0088</a:t>
             </a:r>
           </a:p>
           <a:p>
-            <a:pPr marL="0"/>
-            <a:r>
-              <a:rPr lang="en-US" sz="1300"/>
+            <a:pPr marL="0" indent="0">
+              <a:buNone/>
+            </a:pPr>
+            <a:r>
+              <a:rPr lang="en-US" sz="1300" dirty="0">
+                <a:latin typeface="Courier New" panose="02070309020205020404" pitchFamily="49" charset="0"/>
+                <a:cs typeface="Courier New" panose="02070309020205020404" pitchFamily="49" charset="0"/>
+              </a:rPr>
               <a:t>Epoch 80, Loss: 0.2826, w1: 0.1076, w2: -1.0297, b: -0.0100</a:t>
             </a:r>
           </a:p>
           <a:p>
-            <a:pPr marL="0"/>
-            <a:r>
-              <a:rPr lang="en-US" sz="1300"/>
+            <a:pPr marL="0" indent="0">
+              <a:buNone/>
+            </a:pPr>
+            <a:r>
+              <a:rPr lang="en-US" sz="1300" dirty="0">
+                <a:latin typeface="Courier New" panose="02070309020205020404" pitchFamily="49" charset="0"/>
+                <a:cs typeface="Courier New" panose="02070309020205020404" pitchFamily="49" charset="0"/>
+              </a:rPr>
               <a:t>Epoch 90, Loss: 0.2597, w1: 0.1209, w2: -1.1568, b: -0.0112</a:t>
             </a:r>
           </a:p>
@@ -15591,7 +15663,7 @@
                 <a:latin typeface="Courier New" panose="02070309020205020404" pitchFamily="49" charset="0"/>
                 <a:cs typeface="Courier New" panose="02070309020205020404" pitchFamily="49" charset="0"/>
               </a:rPr>
-              <a:t>requirements.txt</a:t>
+              <a:t>requirements_ECMWF.txt</a:t>
             </a:r>
             <a:r>
               <a:rPr lang="en-US" dirty="0">
@@ -15867,7 +15939,15 @@
           <a:p>
             <a:r>
               <a:rPr lang="en-US" dirty="0"/>
-              <a:t>Designed for students with either AI or weather/climate background</a:t>
+              <a:t>Designed for students with either AI </a:t>
+            </a:r>
+            <a:r>
+              <a:rPr lang="en-US" i="1" dirty="0"/>
+              <a:t>or</a:t>
+            </a:r>
+            <a:r>
+              <a:rPr lang="en-US" dirty="0"/>
+              <a:t> weather/climate background</a:t>
             </a:r>
           </a:p>
           <a:p>
@@ -16258,15 +16338,28 @@
             </a:r>
           </a:p>
           <a:p>
+            <a:pPr lvl="1"/>
+            <a:r>
+              <a:rPr lang="en-US" dirty="0"/>
+              <a:t>Presentations at the end of the day</a:t>
+            </a:r>
+          </a:p>
+          <a:p>
             <a:r>
               <a:rPr lang="en-US" dirty="0"/>
               <a:t>Computing labs use </a:t>
             </a:r>
             <a:r>
-              <a:rPr lang="en-US" dirty="0" err="1"/>
-              <a:t>pytorch</a:t>
-            </a:r>
-            <a:endParaRPr lang="en-US" dirty="0"/>
+              <a:rPr lang="en-US" dirty="0" err="1">
+                <a:latin typeface="Courier New" panose="02070309020205020404" pitchFamily="49" charset="0"/>
+                <a:cs typeface="Courier New" panose="02070309020205020404" pitchFamily="49" charset="0"/>
+              </a:rPr>
+              <a:t>PyTorch</a:t>
+            </a:r>
+            <a:endParaRPr lang="en-US" dirty="0">
+              <a:latin typeface="Courier New" panose="02070309020205020404" pitchFamily="49" charset="0"/>
+              <a:cs typeface="Courier New" panose="02070309020205020404" pitchFamily="49" charset="0"/>
+            </a:endParaRPr>
           </a:p>
           <a:p>
             <a:r>
@@ -16277,7 +16370,7 @@
           <a:p>
             <a:r>
               <a:rPr lang="en-US" dirty="0"/>
-              <a:t>Expect short quizzes, coding tasks, and pen-and-paper exercises</a:t>
+              <a:t>Expect to create short presentations, coding tasks, and pen-and-paper exercises</a:t>
             </a:r>
           </a:p>
         </p:txBody>
@@ -16422,13 +16515,19 @@
           <a:p>
             <a:r>
               <a:rPr lang="en-US" dirty="0"/>
+              <a:t>Transformers</a:t>
+            </a:r>
+          </a:p>
+          <a:p>
+            <a:r>
+              <a:rPr lang="en-US" dirty="0"/>
               <a:t>Graph NNs</a:t>
             </a:r>
           </a:p>
           <a:p>
             <a:r>
               <a:rPr lang="en-US" dirty="0"/>
-              <a:t>Transformers</a:t>
+              <a:t>Probabilistic forecasting with NNs</a:t>
             </a:r>
           </a:p>
         </p:txBody>

</xml_diff>